<commit_message>
Introduction to Deep Learning
</commit_message>
<xml_diff>
--- a/Dive into Deep Learning/1. Introduction to Deep Learning-CH.pptx
+++ b/Dive into Deep Learning/1. Introduction to Deep Learning-CH.pptx
@@ -207,7 +207,7 @@
           <a:p>
             <a:fld id="{0D3578DB-0091-4EF0-9620-E708B7FBB15F}" type="datetimeFigureOut">
               <a:rPr lang="en-US" smtClean="0"/>
-              <a:t>9/25/2019</a:t>
+              <a:t>9/28/2019</a:t>
             </a:fld>
             <a:endParaRPr lang="en-US"/>
           </a:p>
@@ -1993,7 +1993,7 @@
           <a:p>
             <a:fld id="{23EC023D-B61A-4551-8136-DCD5A45A20F2}" type="datetimeFigureOut">
               <a:rPr lang="en-US" smtClean="0"/>
-              <a:t>9/25/2019</a:t>
+              <a:t>9/28/2019</a:t>
             </a:fld>
             <a:endParaRPr lang="en-US"/>
           </a:p>
@@ -2191,7 +2191,7 @@
           <a:p>
             <a:fld id="{23EC023D-B61A-4551-8136-DCD5A45A20F2}" type="datetimeFigureOut">
               <a:rPr lang="en-US" smtClean="0"/>
-              <a:t>9/25/2019</a:t>
+              <a:t>9/28/2019</a:t>
             </a:fld>
             <a:endParaRPr lang="en-US"/>
           </a:p>
@@ -2399,7 +2399,7 @@
           <a:p>
             <a:fld id="{23EC023D-B61A-4551-8136-DCD5A45A20F2}" type="datetimeFigureOut">
               <a:rPr lang="en-US" smtClean="0"/>
-              <a:t>9/25/2019</a:t>
+              <a:t>9/28/2019</a:t>
             </a:fld>
             <a:endParaRPr lang="en-US"/>
           </a:p>
@@ -4983,7 +4983,7 @@
           <a:p>
             <a:fld id="{23EC023D-B61A-4551-8136-DCD5A45A20F2}" type="datetimeFigureOut">
               <a:rPr lang="en-US" smtClean="0"/>
-              <a:t>9/25/2019</a:t>
+              <a:t>9/28/2019</a:t>
             </a:fld>
             <a:endParaRPr lang="en-US"/>
           </a:p>
@@ -5258,7 +5258,7 @@
           <a:p>
             <a:fld id="{23EC023D-B61A-4551-8136-DCD5A45A20F2}" type="datetimeFigureOut">
               <a:rPr lang="en-US" smtClean="0"/>
-              <a:t>9/25/2019</a:t>
+              <a:t>9/28/2019</a:t>
             </a:fld>
             <a:endParaRPr lang="en-US"/>
           </a:p>
@@ -5523,7 +5523,7 @@
           <a:p>
             <a:fld id="{23EC023D-B61A-4551-8136-DCD5A45A20F2}" type="datetimeFigureOut">
               <a:rPr lang="en-US" smtClean="0"/>
-              <a:t>9/25/2019</a:t>
+              <a:t>9/28/2019</a:t>
             </a:fld>
             <a:endParaRPr lang="en-US"/>
           </a:p>
@@ -5935,7 +5935,7 @@
           <a:p>
             <a:fld id="{23EC023D-B61A-4551-8136-DCD5A45A20F2}" type="datetimeFigureOut">
               <a:rPr lang="en-US" smtClean="0"/>
-              <a:t>9/25/2019</a:t>
+              <a:t>9/28/2019</a:t>
             </a:fld>
             <a:endParaRPr lang="en-US"/>
           </a:p>
@@ -6076,7 +6076,7 @@
           <a:p>
             <a:fld id="{23EC023D-B61A-4551-8136-DCD5A45A20F2}" type="datetimeFigureOut">
               <a:rPr lang="en-US" smtClean="0"/>
-              <a:t>9/25/2019</a:t>
+              <a:t>9/28/2019</a:t>
             </a:fld>
             <a:endParaRPr lang="en-US"/>
           </a:p>
@@ -6189,7 +6189,7 @@
           <a:p>
             <a:fld id="{23EC023D-B61A-4551-8136-DCD5A45A20F2}" type="datetimeFigureOut">
               <a:rPr lang="en-US" smtClean="0"/>
-              <a:t>9/25/2019</a:t>
+              <a:t>9/28/2019</a:t>
             </a:fld>
             <a:endParaRPr lang="en-US"/>
           </a:p>
@@ -6500,7 +6500,7 @@
           <a:p>
             <a:fld id="{23EC023D-B61A-4551-8136-DCD5A45A20F2}" type="datetimeFigureOut">
               <a:rPr lang="en-US" smtClean="0"/>
-              <a:t>9/25/2019</a:t>
+              <a:t>9/28/2019</a:t>
             </a:fld>
             <a:endParaRPr lang="en-US"/>
           </a:p>
@@ -6788,7 +6788,7 @@
           <a:p>
             <a:fld id="{23EC023D-B61A-4551-8136-DCD5A45A20F2}" type="datetimeFigureOut">
               <a:rPr lang="en-US" smtClean="0"/>
-              <a:t>9/25/2019</a:t>
+              <a:t>9/28/2019</a:t>
             </a:fld>
             <a:endParaRPr lang="en-US"/>
           </a:p>
@@ -7029,7 +7029,7 @@
           <a:p>
             <a:fld id="{23EC023D-B61A-4551-8136-DCD5A45A20F2}" type="datetimeFigureOut">
               <a:rPr lang="en-US" smtClean="0"/>
-              <a:t>9/25/2019</a:t>
+              <a:t>9/28/2019</a:t>
             </a:fld>
             <a:endParaRPr lang="en-US"/>
           </a:p>
@@ -7879,8 +7879,8 @@
           <a:lstStyle/>
           <a:p>
             <a:r>
-              <a:rPr lang="es" dirty="0"/>
-              <a:t>Resources</a:t>
+              <a:rPr lang="zh-CN" altLang="en-US" dirty="0"/>
+              <a:t>资源</a:t>
             </a:r>
             <a:endParaRPr dirty="0"/>
           </a:p>
@@ -8110,8 +8110,8 @@
               <a:buSzPts val="1100"/>
             </a:pPr>
             <a:r>
-              <a:rPr lang="es" dirty="0"/>
-              <a:t>Contents</a:t>
+              <a:rPr lang="zh-CN" altLang="en-US" dirty="0"/>
+              <a:t>目录</a:t>
             </a:r>
             <a:endParaRPr dirty="0"/>
           </a:p>

</xml_diff>